<commit_message>
update poster and script to plot all the results
</commit_message>
<xml_diff>
--- a/PA4/poster.pptx
+++ b/PA4/poster.pptx
@@ -104,6 +104,11 @@
       </a:defRPr>
     </a:lvl9pPr>
   </p:defaultTextStyle>
+  <p:extLst>
+    <p:ext uri="{EFAFB233-063F-42B5-8137-9DF3F51BA10A}">
+      <p15:sldGuideLst xmlns:p15="http://schemas.microsoft.com/office/powerpoint/2012/main"/>
+    </p:ext>
+  </p:extLst>
 </p:presentation>
 </file>
 
@@ -2968,6 +2973,44 @@
       </p:grpSpPr>
       <p:sp>
         <p:nvSpPr>
+          <p:cNvPr id="40" name="Rounded Rectangle 39"/>
+          <p:cNvSpPr/>
+          <p:nvPr/>
+        </p:nvSpPr>
+        <p:spPr>
+          <a:xfrm>
+            <a:off x="838200" y="27857994"/>
+            <a:ext cx="20243800" cy="4374606"/>
+          </a:xfrm>
+          <a:prstGeom prst="roundRect">
+            <a:avLst/>
+          </a:prstGeom>
+        </p:spPr>
+        <p:style>
+          <a:lnRef idx="2">
+            <a:schemeClr val="dk1"/>
+          </a:lnRef>
+          <a:fillRef idx="1">
+            <a:schemeClr val="lt1"/>
+          </a:fillRef>
+          <a:effectRef idx="0">
+            <a:schemeClr val="dk1"/>
+          </a:effectRef>
+          <a:fontRef idx="minor">
+            <a:schemeClr val="dk1"/>
+          </a:fontRef>
+        </p:style>
+        <p:txBody>
+          <a:bodyPr rtlCol="0" anchor="ctr"/>
+          <a:lstStyle/>
+          <a:p>
+            <a:pPr algn="ctr"/>
+            <a:endParaRPr lang="en-US"/>
+          </a:p>
+        </p:txBody>
+      </p:sp>
+      <p:sp>
+        <p:nvSpPr>
           <p:cNvPr id="8" name="Rounded Rectangle 7"/>
           <p:cNvSpPr/>
           <p:nvPr/>
@@ -2975,7 +3018,7 @@
         <p:spPr>
           <a:xfrm>
             <a:off x="838200" y="3599497"/>
-            <a:ext cx="9271000" cy="28379103"/>
+            <a:ext cx="9271000" cy="23854247"/>
           </a:xfrm>
           <a:prstGeom prst="roundRect">
             <a:avLst>
@@ -3138,77 +3181,6 @@
       </p:sp>
       <p:sp>
         <p:nvSpPr>
-          <p:cNvPr id="9" name="Rounded Rectangle 8"/>
-          <p:cNvSpPr/>
-          <p:nvPr/>
-        </p:nvSpPr>
-        <p:spPr>
-          <a:xfrm>
-            <a:off x="11811000" y="3599497"/>
-            <a:ext cx="9271000" cy="28379103"/>
-          </a:xfrm>
-          <a:prstGeom prst="roundRect">
-            <a:avLst>
-              <a:gd name="adj" fmla="val 5982"/>
-            </a:avLst>
-          </a:prstGeom>
-        </p:spPr>
-        <p:style>
-          <a:lnRef idx="2">
-            <a:schemeClr val="dk1"/>
-          </a:lnRef>
-          <a:fillRef idx="1">
-            <a:schemeClr val="lt1"/>
-          </a:fillRef>
-          <a:effectRef idx="0">
-            <a:schemeClr val="dk1"/>
-          </a:effectRef>
-          <a:fontRef idx="minor">
-            <a:schemeClr val="dk1"/>
-          </a:fontRef>
-        </p:style>
-        <p:txBody>
-          <a:bodyPr rtlCol="0" anchor="ctr"/>
-          <a:lstStyle/>
-          <a:p>
-            <a:pPr algn="ctr"/>
-            <a:endParaRPr lang="en-US"/>
-          </a:p>
-        </p:txBody>
-      </p:sp>
-      <p:sp>
-        <p:nvSpPr>
-          <p:cNvPr id="10" name="TextBox 9"/>
-          <p:cNvSpPr txBox="1"/>
-          <p:nvPr/>
-        </p:nvSpPr>
-        <p:spPr>
-          <a:xfrm>
-            <a:off x="838200" y="3937916"/>
-            <a:ext cx="9245600" cy="769441"/>
-          </a:xfrm>
-          <a:prstGeom prst="rect">
-            <a:avLst/>
-          </a:prstGeom>
-          <a:noFill/>
-        </p:spPr>
-        <p:txBody>
-          <a:bodyPr wrap="square" rtlCol="0" anchor="ctr">
-            <a:spAutoFit/>
-          </a:bodyPr>
-          <a:lstStyle/>
-          <a:p>
-            <a:pPr algn="ctr"/>
-            <a:r>
-              <a:rPr lang="en-US" sz="4400" u="dbl" cap="small" dirty="0" smtClean="0"/>
-              <a:t>Abstract</a:t>
-            </a:r>
-            <a:endParaRPr lang="en-US" sz="4400" u="dbl" cap="small" dirty="0"/>
-          </a:p>
-        </p:txBody>
-      </p:sp>
-      <p:sp>
-        <p:nvSpPr>
           <p:cNvPr id="11" name="TextBox 10"/>
           <p:cNvSpPr txBox="1"/>
           <p:nvPr/>
@@ -3239,14 +3211,14 @@
       </p:sp>
       <p:sp>
         <p:nvSpPr>
-          <p:cNvPr id="12" name="TextBox 11"/>
+          <p:cNvPr id="15" name="TextBox 14"/>
           <p:cNvSpPr txBox="1"/>
           <p:nvPr/>
         </p:nvSpPr>
         <p:spPr>
           <a:xfrm>
-            <a:off x="-15087600" y="3937916"/>
-            <a:ext cx="12979400" cy="4879028"/>
+            <a:off x="838200" y="27803943"/>
+            <a:ext cx="20243800" cy="769441"/>
           </a:xfrm>
           <a:prstGeom prst="rect">
             <a:avLst/>
@@ -3254,59 +3226,805 @@
           <a:noFill/>
         </p:spPr>
         <p:txBody>
-          <a:bodyPr wrap="square" rtlCol="0">
+          <a:bodyPr wrap="square" rtlCol="0" anchor="ctr">
             <a:spAutoFit/>
           </a:bodyPr>
           <a:lstStyle/>
           <a:p>
-            <a:r>
-              <a:rPr lang="en-US" dirty="0" smtClean="0"/>
-              <a:t>Abstract</a:t>
-            </a:r>
-          </a:p>
-          <a:p>
-            <a:r>
-              <a:rPr lang="en-US" dirty="0" smtClean="0"/>
-              <a:t>Motivation</a:t>
-            </a:r>
-          </a:p>
-          <a:p>
-            <a:r>
-              <a:rPr lang="en-US" dirty="0" smtClean="0"/>
-              <a:t>Proposed Work</a:t>
-            </a:r>
-          </a:p>
-          <a:p>
-            <a:r>
-              <a:rPr lang="en-US" dirty="0" smtClean="0"/>
-              <a:t>Evaluation</a:t>
-            </a:r>
-          </a:p>
-          <a:p>
-            <a:r>
-              <a:rPr lang="en-US" dirty="0" smtClean="0"/>
-              <a:t>Conclusions</a:t>
-            </a:r>
-          </a:p>
-          <a:p>
-            <a:r>
-              <a:rPr lang="en-US" dirty="0" smtClean="0"/>
-              <a:t>References</a:t>
-            </a:r>
-            <a:endParaRPr lang="en-US" dirty="0"/>
-          </a:p>
-        </p:txBody>
-      </p:sp>
-      <p:sp>
-        <p:nvSpPr>
-          <p:cNvPr id="13" name="TextBox 12"/>
+            <a:pPr algn="ctr"/>
+            <a:r>
+              <a:rPr lang="en-US" sz="4400" u="dbl" cap="small" dirty="0" smtClean="0"/>
+              <a:t>Conclusion</a:t>
+            </a:r>
+            <a:endParaRPr lang="en-US" sz="4400" u="dbl" cap="small" dirty="0"/>
+          </a:p>
+        </p:txBody>
+      </p:sp>
+      <p:grpSp>
+        <p:nvGrpSpPr>
+          <p:cNvPr id="37" name="Group 36"/>
+          <p:cNvGrpSpPr/>
+          <p:nvPr/>
+        </p:nvGrpSpPr>
+        <p:grpSpPr>
+          <a:xfrm>
+            <a:off x="838200" y="3937916"/>
+            <a:ext cx="9271000" cy="7356434"/>
+            <a:chOff x="838200" y="3937916"/>
+            <a:chExt cx="9271000" cy="7356434"/>
+          </a:xfrm>
+        </p:grpSpPr>
+        <p:sp>
+          <p:nvSpPr>
+            <p:cNvPr id="10" name="TextBox 9"/>
+            <p:cNvSpPr txBox="1"/>
+            <p:nvPr/>
+          </p:nvSpPr>
+          <p:spPr>
+            <a:xfrm>
+              <a:off x="838200" y="3937916"/>
+              <a:ext cx="9245600" cy="769441"/>
+            </a:xfrm>
+            <a:prstGeom prst="rect">
+              <a:avLst/>
+            </a:prstGeom>
+            <a:noFill/>
+          </p:spPr>
+          <p:txBody>
+            <a:bodyPr wrap="square" rtlCol="0" anchor="ctr">
+              <a:spAutoFit/>
+            </a:bodyPr>
+            <a:lstStyle/>
+            <a:p>
+              <a:pPr algn="ctr"/>
+              <a:r>
+                <a:rPr lang="en-US" sz="4400" u="dbl" cap="small" dirty="0" smtClean="0"/>
+                <a:t>Abstract</a:t>
+              </a:r>
+              <a:endParaRPr lang="en-US" sz="4400" u="dbl" cap="small" dirty="0"/>
+            </a:p>
+          </p:txBody>
+        </p:sp>
+        <p:sp>
+          <p:nvSpPr>
+            <p:cNvPr id="7" name="TextBox 6"/>
+            <p:cNvSpPr txBox="1"/>
+            <p:nvPr/>
+          </p:nvSpPr>
+          <p:spPr>
+            <a:xfrm>
+              <a:off x="838200" y="4707932"/>
+              <a:ext cx="9271000" cy="6586418"/>
+            </a:xfrm>
+            <a:prstGeom prst="rect">
+              <a:avLst/>
+            </a:prstGeom>
+            <a:noFill/>
+          </p:spPr>
+          <p:txBody>
+            <a:bodyPr wrap="square" lIns="182880" tIns="91440" rIns="182880" bIns="91440" rtlCol="0">
+              <a:spAutoFit/>
+            </a:bodyPr>
+            <a:lstStyle/>
+            <a:p>
+              <a:pPr algn="just"/>
+              <a:r>
+                <a:rPr lang="en-US" sz="3200" dirty="0" smtClean="0"/>
+                <a:t>In this poster, we compare the performance (via throughput and latency) of four NoSQL database systems over three operations: put, get, and delete. Three of these systems (Cassandra, </a:t>
+              </a:r>
+              <a:r>
+                <a:rPr lang="en-US" sz="3200" dirty="0" err="1" smtClean="0"/>
+                <a:t>Riak</a:t>
+              </a:r>
+              <a:r>
+                <a:rPr lang="en-US" sz="3200" dirty="0" smtClean="0"/>
+                <a:t>, and </a:t>
+              </a:r>
+              <a:r>
+                <a:rPr lang="en-US" sz="3200" dirty="0" err="1" smtClean="0"/>
+                <a:t>Redis</a:t>
+              </a:r>
+              <a:r>
+                <a:rPr lang="en-US" sz="3200" dirty="0" smtClean="0"/>
+                <a:t>) are developed and supported by teams of developers and implement advanced operations such as replication, </a:t>
+              </a:r>
+              <a:r>
+                <a:rPr lang="en-US" sz="3200" dirty="0" err="1" smtClean="0"/>
+                <a:t>sharding</a:t>
+              </a:r>
+              <a:r>
+                <a:rPr lang="en-US" sz="3200" dirty="0" smtClean="0"/>
+                <a:t>, or node failure management. The last system has been implemented </a:t>
+              </a:r>
+              <a:r>
+                <a:rPr lang="en-US" sz="3200" dirty="0" smtClean="0"/>
+                <a:t>in Python during a </a:t>
+              </a:r>
+              <a:r>
+                <a:rPr lang="en-US" sz="3200" dirty="0" smtClean="0"/>
+                <a:t>one-semester </a:t>
+              </a:r>
+              <a:r>
+                <a:rPr lang="en-US" sz="3200" dirty="0" smtClean="0"/>
+                <a:t>class. </a:t>
+              </a:r>
+              <a:r>
+                <a:rPr lang="en-US" sz="3200" dirty="0" smtClean="0"/>
+                <a:t>We find that </a:t>
+              </a:r>
+              <a:r>
+                <a:rPr lang="en-US" sz="3200" dirty="0" err="1" smtClean="0"/>
+                <a:t>Redis</a:t>
+              </a:r>
+              <a:r>
+                <a:rPr lang="en-US" sz="3200" dirty="0" smtClean="0"/>
+                <a:t> </a:t>
+              </a:r>
+              <a:r>
+                <a:rPr lang="en-US" sz="3200" dirty="0" smtClean="0"/>
+                <a:t>outperforms all the other systems </a:t>
+              </a:r>
+              <a:r>
+                <a:rPr lang="en-US" sz="3200" dirty="0" smtClean="0"/>
+                <a:t>for </a:t>
+              </a:r>
+              <a:r>
+                <a:rPr lang="en-US" sz="3200" dirty="0" smtClean="0"/>
+                <a:t>these operations</a:t>
+              </a:r>
+              <a:r>
+                <a:rPr lang="en-US" sz="3200" dirty="0" smtClean="0"/>
+                <a:t>. Cassandra seems to be the less scalable system whereas </a:t>
+              </a:r>
+              <a:r>
+                <a:rPr lang="en-US" sz="3200" dirty="0" err="1" smtClean="0"/>
+                <a:t>PyDHT</a:t>
+              </a:r>
+              <a:r>
+                <a:rPr lang="en-US" sz="3200" dirty="0" smtClean="0"/>
+                <a:t> is close to </a:t>
+              </a:r>
+              <a:r>
+                <a:rPr lang="en-US" sz="3200" dirty="0" err="1" smtClean="0"/>
+                <a:t>Redis</a:t>
+              </a:r>
+              <a:r>
+                <a:rPr lang="en-US" sz="3200" dirty="0" smtClean="0"/>
+                <a:t> in throughput and latency.</a:t>
+              </a:r>
+              <a:endParaRPr lang="en-US" sz="3200" dirty="0"/>
+            </a:p>
+          </p:txBody>
+        </p:sp>
+      </p:grpSp>
+      <p:grpSp>
+        <p:nvGrpSpPr>
+          <p:cNvPr id="36" name="Group 35"/>
+          <p:cNvGrpSpPr/>
+          <p:nvPr/>
+        </p:nvGrpSpPr>
+        <p:grpSpPr>
+          <a:xfrm>
+            <a:off x="838200" y="11284949"/>
+            <a:ext cx="9271000" cy="6370974"/>
+            <a:chOff x="838200" y="11284949"/>
+            <a:chExt cx="9271000" cy="6370974"/>
+          </a:xfrm>
+        </p:grpSpPr>
+        <p:sp>
+          <p:nvSpPr>
+            <p:cNvPr id="13" name="TextBox 12"/>
+            <p:cNvSpPr txBox="1"/>
+            <p:nvPr/>
+          </p:nvSpPr>
+          <p:spPr>
+            <a:xfrm>
+              <a:off x="863600" y="11284949"/>
+              <a:ext cx="9245600" cy="769441"/>
+            </a:xfrm>
+            <a:prstGeom prst="rect">
+              <a:avLst/>
+            </a:prstGeom>
+            <a:noFill/>
+          </p:spPr>
+          <p:txBody>
+            <a:bodyPr wrap="square" rtlCol="0" anchor="ctr">
+              <a:spAutoFit/>
+            </a:bodyPr>
+            <a:lstStyle/>
+            <a:p>
+              <a:pPr algn="ctr"/>
+              <a:r>
+                <a:rPr lang="en-US" sz="4400" u="dbl" cap="small" dirty="0"/>
+                <a:t>Motivation</a:t>
+              </a:r>
+            </a:p>
+          </p:txBody>
+        </p:sp>
+        <p:sp>
+          <p:nvSpPr>
+            <p:cNvPr id="18" name="TextBox 17"/>
+            <p:cNvSpPr txBox="1"/>
+            <p:nvPr/>
+          </p:nvSpPr>
+          <p:spPr>
+            <a:xfrm>
+              <a:off x="838200" y="12054390"/>
+              <a:ext cx="9245599" cy="5601533"/>
+            </a:xfrm>
+            <a:prstGeom prst="rect">
+              <a:avLst/>
+            </a:prstGeom>
+            <a:noFill/>
+          </p:spPr>
+          <p:txBody>
+            <a:bodyPr wrap="square" lIns="182880" tIns="91440" rIns="182880" bIns="91440" rtlCol="0">
+              <a:spAutoFit/>
+            </a:bodyPr>
+            <a:lstStyle/>
+            <a:p>
+              <a:pPr marL="457200" indent="-457200" algn="just">
+                <a:buFont typeface="Arial" panose="020B0604020202020204" pitchFamily="34" charset="0"/>
+                <a:buChar char="•"/>
+              </a:pPr>
+              <a:r>
+                <a:rPr lang="en-US" sz="3200" dirty="0" smtClean="0"/>
+                <a:t>Centralized databases disadvantages:</a:t>
+              </a:r>
+            </a:p>
+            <a:p>
+              <a:pPr marL="1773936" lvl="1" indent="-457200" algn="just">
+                <a:buFont typeface="Arial" panose="020B0604020202020204" pitchFamily="34" charset="0"/>
+                <a:buChar char="•"/>
+              </a:pPr>
+              <a:r>
+                <a:rPr lang="en-US" sz="3200" dirty="0" smtClean="0"/>
+                <a:t>Single point of failure.</a:t>
+              </a:r>
+            </a:p>
+            <a:p>
+              <a:pPr marL="1773936" lvl="1" indent="-457200" algn="just">
+                <a:buFont typeface="Arial" panose="020B0604020202020204" pitchFamily="34" charset="0"/>
+                <a:buChar char="•"/>
+              </a:pPr>
+              <a:r>
+                <a:rPr lang="en-US" sz="3200" dirty="0" smtClean="0"/>
+                <a:t>Bottleneck on IO or CPU.</a:t>
+              </a:r>
+            </a:p>
+            <a:p>
+              <a:pPr marL="1773936" lvl="1" indent="-457200" algn="just">
+                <a:buFont typeface="Arial" panose="020B0604020202020204" pitchFamily="34" charset="0"/>
+                <a:buChar char="•"/>
+              </a:pPr>
+              <a:r>
+                <a:rPr lang="en-US" sz="3200" dirty="0" smtClean="0"/>
+                <a:t>Not flexible enough for high scale computing.</a:t>
+              </a:r>
+            </a:p>
+            <a:p>
+              <a:pPr marL="457200" indent="-457200" algn="just">
+                <a:buFont typeface="Arial" panose="020B0604020202020204" pitchFamily="34" charset="0"/>
+                <a:buChar char="•"/>
+              </a:pPr>
+              <a:r>
+                <a:rPr lang="en-US" sz="3200" dirty="0" smtClean="0"/>
+                <a:t>Relational database?</a:t>
+              </a:r>
+            </a:p>
+            <a:p>
+              <a:pPr marL="1773936" lvl="1" indent="-457200" algn="just">
+                <a:buFont typeface="Arial" panose="020B0604020202020204" pitchFamily="34" charset="0"/>
+                <a:buChar char="•"/>
+              </a:pPr>
+              <a:r>
+                <a:rPr lang="en-US" sz="3200" dirty="0" smtClean="0"/>
+                <a:t>Relational model is not flexible.</a:t>
+              </a:r>
+            </a:p>
+            <a:p>
+              <a:pPr marL="1773936" lvl="1" indent="-457200" algn="just">
+                <a:buFont typeface="Arial" panose="020B0604020202020204" pitchFamily="34" charset="0"/>
+                <a:buChar char="•"/>
+              </a:pPr>
+              <a:r>
+                <a:rPr lang="en-US" sz="3200" dirty="0" smtClean="0"/>
+                <a:t>Languages similar to SQL can be implemented (e.g. CQL in Cassandra).</a:t>
+              </a:r>
+            </a:p>
+            <a:p>
+              <a:pPr marL="1773936" lvl="1" indent="-457200" algn="just">
+                <a:buFont typeface="Arial" panose="020B0604020202020204" pitchFamily="34" charset="0"/>
+                <a:buChar char="•"/>
+              </a:pPr>
+              <a:r>
+                <a:rPr lang="en-US" sz="3200" dirty="0" smtClean="0"/>
+                <a:t>Key-value stores can easily be used by other applications (e.g. ZHT).</a:t>
+              </a:r>
+            </a:p>
+          </p:txBody>
+        </p:sp>
+      </p:grpSp>
+      <p:grpSp>
+        <p:nvGrpSpPr>
+          <p:cNvPr id="38" name="Group 37"/>
+          <p:cNvGrpSpPr/>
+          <p:nvPr/>
+        </p:nvGrpSpPr>
+        <p:grpSpPr>
+          <a:xfrm>
+            <a:off x="838200" y="17583351"/>
+            <a:ext cx="9264446" cy="9810677"/>
+            <a:chOff x="838200" y="19507155"/>
+            <a:chExt cx="9264446" cy="9810677"/>
+          </a:xfrm>
+        </p:grpSpPr>
+        <p:sp>
+          <p:nvSpPr>
+            <p:cNvPr id="14" name="TextBox 13"/>
+            <p:cNvSpPr txBox="1"/>
+            <p:nvPr/>
+          </p:nvSpPr>
+          <p:spPr>
+            <a:xfrm>
+              <a:off x="838200" y="19507155"/>
+              <a:ext cx="9245600" cy="762046"/>
+            </a:xfrm>
+            <a:prstGeom prst="rect">
+              <a:avLst/>
+            </a:prstGeom>
+            <a:noFill/>
+          </p:spPr>
+          <p:txBody>
+            <a:bodyPr wrap="square" rtlCol="0" anchor="ctr">
+              <a:spAutoFit/>
+            </a:bodyPr>
+            <a:lstStyle/>
+            <a:p>
+              <a:pPr algn="ctr"/>
+              <a:r>
+                <a:rPr lang="en-US" sz="4400" u="dbl" cap="small" dirty="0"/>
+                <a:t>Proposed Work</a:t>
+              </a:r>
+            </a:p>
+          </p:txBody>
+        </p:sp>
+        <p:sp>
+          <p:nvSpPr>
+            <p:cNvPr id="20" name="TextBox 19"/>
+            <p:cNvSpPr txBox="1"/>
+            <p:nvPr/>
+          </p:nvSpPr>
+          <p:spPr>
+            <a:xfrm>
+              <a:off x="863600" y="20269201"/>
+              <a:ext cx="9239046" cy="9048631"/>
+            </a:xfrm>
+            <a:prstGeom prst="rect">
+              <a:avLst/>
+            </a:prstGeom>
+            <a:noFill/>
+          </p:spPr>
+          <p:txBody>
+            <a:bodyPr wrap="square" lIns="182880" tIns="91440" rIns="182880" bIns="91440" rtlCol="0">
+              <a:spAutoFit/>
+            </a:bodyPr>
+            <a:lstStyle/>
+            <a:p>
+              <a:pPr marL="457200" indent="-457200" algn="just">
+                <a:buFont typeface="Arial" panose="020B0604020202020204" pitchFamily="34" charset="0"/>
+                <a:buChar char="•"/>
+              </a:pPr>
+              <a:r>
+                <a:rPr lang="en-US" sz="3200" dirty="0" smtClean="0"/>
+                <a:t>Compare throughput and latency performance of four NoSQL systems on put, get, and delete operations:</a:t>
+              </a:r>
+            </a:p>
+            <a:p>
+              <a:pPr marL="1773936" lvl="1" indent="-457200" algn="just">
+                <a:buFont typeface="Arial" panose="020B0604020202020204" pitchFamily="34" charset="0"/>
+                <a:buChar char="•"/>
+              </a:pPr>
+              <a:r>
+                <a:rPr lang="en-US" sz="3200" dirty="0" smtClean="0"/>
+                <a:t>Cassandra</a:t>
+              </a:r>
+            </a:p>
+            <a:p>
+              <a:pPr marL="1773936" lvl="1" indent="-457200" algn="just">
+                <a:buFont typeface="Arial" panose="020B0604020202020204" pitchFamily="34" charset="0"/>
+                <a:buChar char="•"/>
+              </a:pPr>
+              <a:r>
+                <a:rPr lang="en-US" sz="3200" dirty="0" err="1" smtClean="0"/>
+                <a:t>Riak</a:t>
+              </a:r>
+              <a:endParaRPr lang="en-US" sz="3200" dirty="0" smtClean="0"/>
+            </a:p>
+            <a:p>
+              <a:pPr marL="1773936" lvl="1" indent="-457200" algn="just">
+                <a:buFont typeface="Arial" panose="020B0604020202020204" pitchFamily="34" charset="0"/>
+                <a:buChar char="•"/>
+              </a:pPr>
+              <a:r>
+                <a:rPr lang="en-US" sz="3200" dirty="0" err="1" smtClean="0"/>
+                <a:t>Redis</a:t>
+              </a:r>
+              <a:endParaRPr lang="en-US" sz="3200" dirty="0" smtClean="0"/>
+            </a:p>
+            <a:p>
+              <a:pPr marL="1773936" lvl="1" indent="-457200" algn="just">
+                <a:buFont typeface="Arial" panose="020B0604020202020204" pitchFamily="34" charset="0"/>
+                <a:buChar char="•"/>
+              </a:pPr>
+              <a:r>
+                <a:rPr lang="en-US" sz="3200" dirty="0" err="1" smtClean="0"/>
+                <a:t>PyDHT</a:t>
+              </a:r>
+              <a:endParaRPr lang="en-US" sz="3200" dirty="0" smtClean="0"/>
+            </a:p>
+            <a:p>
+              <a:pPr marL="457200" indent="-457200" algn="just">
+                <a:buFont typeface="Arial" panose="020B0604020202020204" pitchFamily="34" charset="0"/>
+                <a:buChar char="•"/>
+              </a:pPr>
+              <a:r>
+                <a:rPr lang="en-US" sz="3200" dirty="0" smtClean="0"/>
+                <a:t>Deploy each system over 16 m3.large EC2 instances.</a:t>
+              </a:r>
+            </a:p>
+            <a:p>
+              <a:pPr marL="457200" indent="-457200" algn="just">
+                <a:buFont typeface="Arial" panose="020B0604020202020204" pitchFamily="34" charset="0"/>
+                <a:buChar char="•"/>
+              </a:pPr>
+              <a:r>
+                <a:rPr lang="en-US" sz="3200" dirty="0" smtClean="0"/>
+                <a:t>Scale the nodes executing concurrent requests from 1 to 16.</a:t>
+              </a:r>
+            </a:p>
+            <a:p>
+              <a:pPr marL="457200" indent="-457200" algn="just">
+                <a:buFont typeface="Arial" panose="020B0604020202020204" pitchFamily="34" charset="0"/>
+                <a:buChar char="•"/>
+              </a:pPr>
+              <a:r>
+                <a:rPr lang="en-US" sz="3200" dirty="0" smtClean="0"/>
+                <a:t>Each concurrent node </a:t>
+              </a:r>
+              <a:r>
+                <a:rPr lang="en-US" sz="3200" dirty="0" smtClean="0"/>
+                <a:t>runs 30K </a:t>
+              </a:r>
+              <a:r>
+                <a:rPr lang="en-US" sz="3200" dirty="0" smtClean="0"/>
+                <a:t>operations of each </a:t>
+              </a:r>
+              <a:r>
+                <a:rPr lang="en-US" sz="3200" dirty="0" smtClean="0"/>
+                <a:t>type: put</a:t>
+              </a:r>
+              <a:r>
+                <a:rPr lang="en-US" sz="3200" dirty="0" smtClean="0"/>
+                <a:t>, get, </a:t>
+              </a:r>
+              <a:r>
+                <a:rPr lang="en-US" sz="3200" dirty="0" smtClean="0"/>
+                <a:t>delete (10B keys and 90B values).</a:t>
+              </a:r>
+              <a:endParaRPr lang="en-US" sz="3200" dirty="0" smtClean="0"/>
+            </a:p>
+            <a:p>
+              <a:pPr marL="457200" indent="-457200" algn="just">
+                <a:buFont typeface="Arial" panose="020B0604020202020204" pitchFamily="34" charset="0"/>
+                <a:buChar char="•"/>
+              </a:pPr>
+              <a:r>
+                <a:rPr lang="en-US" sz="3200" dirty="0" smtClean="0"/>
+                <a:t>Compute throughput in </a:t>
+              </a:r>
+              <a:r>
+                <a:rPr lang="en-US" sz="3200" dirty="0" err="1" smtClean="0"/>
+                <a:t>KOps</a:t>
+              </a:r>
+              <a:r>
+                <a:rPr lang="en-US" sz="3200" dirty="0" smtClean="0"/>
+                <a:t>/sec and latency in </a:t>
+              </a:r>
+              <a:r>
+                <a:rPr lang="en-US" sz="3200" dirty="0" err="1" smtClean="0"/>
+                <a:t>ms.</a:t>
+              </a:r>
+              <a:endParaRPr lang="en-US" sz="3200" dirty="0" smtClean="0"/>
+            </a:p>
+            <a:p>
+              <a:pPr marL="457200" indent="-457200" algn="just">
+                <a:buFont typeface="Arial" panose="020B0604020202020204" pitchFamily="34" charset="0"/>
+                <a:buChar char="•"/>
+              </a:pPr>
+              <a:r>
+                <a:rPr lang="en-US" sz="3200" dirty="0" smtClean="0"/>
+                <a:t>Visualize the results to know which system provides the best throughput, the lowest latency.</a:t>
+              </a:r>
+            </a:p>
+            <a:p>
+              <a:pPr marL="457200" indent="-457200" algn="just">
+                <a:buFont typeface="Arial" panose="020B0604020202020204" pitchFamily="34" charset="0"/>
+                <a:buChar char="•"/>
+              </a:pPr>
+              <a:r>
+                <a:rPr lang="en-US" sz="3200" dirty="0" smtClean="0"/>
+                <a:t>Which system is the most scalable overall?</a:t>
+              </a:r>
+            </a:p>
+          </p:txBody>
+        </p:sp>
+      </p:grpSp>
+      <p:grpSp>
+        <p:nvGrpSpPr>
+          <p:cNvPr id="39" name="Group 38"/>
+          <p:cNvGrpSpPr/>
+          <p:nvPr/>
+        </p:nvGrpSpPr>
+        <p:grpSpPr>
+          <a:xfrm>
+            <a:off x="10203283" y="5211390"/>
+            <a:ext cx="11742317" cy="21239865"/>
+            <a:chOff x="10203283" y="5211390"/>
+            <a:chExt cx="11742317" cy="21239865"/>
+          </a:xfrm>
+        </p:grpSpPr>
+        <p:pic>
+          <p:nvPicPr>
+            <p:cNvPr id="28" name="Picture 27"/>
+            <p:cNvPicPr>
+              <a:picLocks noChangeAspect="1"/>
+            </p:cNvPicPr>
+            <p:nvPr/>
+          </p:nvPicPr>
+          <p:blipFill>
+            <a:blip r:embed="rId2">
+              <a:extLst>
+                <a:ext uri="{28A0092B-C50C-407E-A947-70E740481C1C}">
+                  <a14:useLocalDpi xmlns:a14="http://schemas.microsoft.com/office/drawing/2010/main" val="0"/>
+                </a:ext>
+              </a:extLst>
+            </a:blip>
+            <a:stretch>
+              <a:fillRect/>
+            </a:stretch>
+          </p:blipFill>
+          <p:spPr>
+            <a:xfrm>
+              <a:off x="10203284" y="5211390"/>
+              <a:ext cx="5843370" cy="5029200"/>
+            </a:xfrm>
+            <a:prstGeom prst="rect">
+              <a:avLst/>
+            </a:prstGeom>
+          </p:spPr>
+        </p:pic>
+        <p:pic>
+          <p:nvPicPr>
+            <p:cNvPr id="29" name="Picture 28"/>
+            <p:cNvPicPr>
+              <a:picLocks noChangeAspect="1"/>
+            </p:cNvPicPr>
+            <p:nvPr/>
+          </p:nvPicPr>
+          <p:blipFill>
+            <a:blip r:embed="rId3">
+              <a:extLst>
+                <a:ext uri="{28A0092B-C50C-407E-A947-70E740481C1C}">
+                  <a14:useLocalDpi xmlns:a14="http://schemas.microsoft.com/office/drawing/2010/main" val="0"/>
+                </a:ext>
+              </a:extLst>
+            </a:blip>
+            <a:stretch>
+              <a:fillRect/>
+            </a:stretch>
+          </p:blipFill>
+          <p:spPr>
+            <a:xfrm>
+              <a:off x="16046653" y="21422055"/>
+              <a:ext cx="5758561" cy="5029200"/>
+            </a:xfrm>
+            <a:prstGeom prst="rect">
+              <a:avLst/>
+            </a:prstGeom>
+          </p:spPr>
+        </p:pic>
+        <p:pic>
+          <p:nvPicPr>
+            <p:cNvPr id="30" name="Picture 29"/>
+            <p:cNvPicPr>
+              <a:picLocks noChangeAspect="1"/>
+            </p:cNvPicPr>
+            <p:nvPr/>
+          </p:nvPicPr>
+          <p:blipFill>
+            <a:blip r:embed="rId4">
+              <a:extLst>
+                <a:ext uri="{28A0092B-C50C-407E-A947-70E740481C1C}">
+                  <a14:useLocalDpi xmlns:a14="http://schemas.microsoft.com/office/drawing/2010/main" val="0"/>
+                </a:ext>
+              </a:extLst>
+            </a:blip>
+            <a:stretch>
+              <a:fillRect/>
+            </a:stretch>
+          </p:blipFill>
+          <p:spPr>
+            <a:xfrm>
+              <a:off x="10203283" y="21422055"/>
+              <a:ext cx="5843370" cy="5029200"/>
+            </a:xfrm>
+            <a:prstGeom prst="rect">
+              <a:avLst/>
+            </a:prstGeom>
+          </p:spPr>
+        </p:pic>
+        <p:pic>
+          <p:nvPicPr>
+            <p:cNvPr id="31" name="Picture 30"/>
+            <p:cNvPicPr>
+              <a:picLocks noChangeAspect="1"/>
+            </p:cNvPicPr>
+            <p:nvPr/>
+          </p:nvPicPr>
+          <p:blipFill>
+            <a:blip r:embed="rId5">
+              <a:extLst>
+                <a:ext uri="{28A0092B-C50C-407E-A947-70E740481C1C}">
+                  <a14:useLocalDpi xmlns:a14="http://schemas.microsoft.com/office/drawing/2010/main" val="0"/>
+                </a:ext>
+              </a:extLst>
+            </a:blip>
+            <a:stretch>
+              <a:fillRect/>
+            </a:stretch>
+          </p:blipFill>
+          <p:spPr>
+            <a:xfrm>
+              <a:off x="16046653" y="15888823"/>
+              <a:ext cx="5834889" cy="5029200"/>
+            </a:xfrm>
+            <a:prstGeom prst="rect">
+              <a:avLst/>
+            </a:prstGeom>
+          </p:spPr>
+        </p:pic>
+        <p:pic>
+          <p:nvPicPr>
+            <p:cNvPr id="32" name="Picture 31"/>
+            <p:cNvPicPr>
+              <a:picLocks noChangeAspect="1"/>
+            </p:cNvPicPr>
+            <p:nvPr/>
+          </p:nvPicPr>
+          <p:blipFill>
+            <a:blip r:embed="rId6">
+              <a:extLst>
+                <a:ext uri="{28A0092B-C50C-407E-A947-70E740481C1C}">
+                  <a14:useLocalDpi xmlns:a14="http://schemas.microsoft.com/office/drawing/2010/main" val="0"/>
+                </a:ext>
+              </a:extLst>
+            </a:blip>
+            <a:stretch>
+              <a:fillRect/>
+            </a:stretch>
+          </p:blipFill>
+          <p:spPr>
+            <a:xfrm>
+              <a:off x="16059824" y="10543945"/>
+              <a:ext cx="5885776" cy="5029200"/>
+            </a:xfrm>
+            <a:prstGeom prst="rect">
+              <a:avLst/>
+            </a:prstGeom>
+          </p:spPr>
+        </p:pic>
+        <p:pic>
+          <p:nvPicPr>
+            <p:cNvPr id="33" name="Picture 32"/>
+            <p:cNvPicPr>
+              <a:picLocks noChangeAspect="1"/>
+            </p:cNvPicPr>
+            <p:nvPr/>
+          </p:nvPicPr>
+          <p:blipFill>
+            <a:blip r:embed="rId7">
+              <a:extLst>
+                <a:ext uri="{28A0092B-C50C-407E-A947-70E740481C1C}">
+                  <a14:useLocalDpi xmlns:a14="http://schemas.microsoft.com/office/drawing/2010/main" val="0"/>
+                </a:ext>
+              </a:extLst>
+            </a:blip>
+            <a:stretch>
+              <a:fillRect/>
+            </a:stretch>
+          </p:blipFill>
+          <p:spPr>
+            <a:xfrm>
+              <a:off x="16046653" y="5211390"/>
+              <a:ext cx="5758561" cy="5029200"/>
+            </a:xfrm>
+            <a:prstGeom prst="rect">
+              <a:avLst/>
+            </a:prstGeom>
+          </p:spPr>
+        </p:pic>
+        <p:pic>
+          <p:nvPicPr>
+            <p:cNvPr id="34" name="Picture 33"/>
+            <p:cNvPicPr>
+              <a:picLocks noChangeAspect="1"/>
+            </p:cNvPicPr>
+            <p:nvPr/>
+          </p:nvPicPr>
+          <p:blipFill>
+            <a:blip r:embed="rId8">
+              <a:extLst>
+                <a:ext uri="{28A0092B-C50C-407E-A947-70E740481C1C}">
+                  <a14:useLocalDpi xmlns:a14="http://schemas.microsoft.com/office/drawing/2010/main" val="0"/>
+                </a:ext>
+              </a:extLst>
+            </a:blip>
+            <a:stretch>
+              <a:fillRect/>
+            </a:stretch>
+          </p:blipFill>
+          <p:spPr>
+            <a:xfrm>
+              <a:off x="10203283" y="15888823"/>
+              <a:ext cx="5843370" cy="5029200"/>
+            </a:xfrm>
+            <a:prstGeom prst="rect">
+              <a:avLst/>
+            </a:prstGeom>
+          </p:spPr>
+        </p:pic>
+        <p:pic>
+          <p:nvPicPr>
+            <p:cNvPr id="35" name="Picture 34"/>
+            <p:cNvPicPr>
+              <a:picLocks noChangeAspect="1"/>
+            </p:cNvPicPr>
+            <p:nvPr/>
+          </p:nvPicPr>
+          <p:blipFill>
+            <a:blip r:embed="rId9">
+              <a:extLst>
+                <a:ext uri="{28A0092B-C50C-407E-A947-70E740481C1C}">
+                  <a14:useLocalDpi xmlns:a14="http://schemas.microsoft.com/office/drawing/2010/main" val="0"/>
+                </a:ext>
+              </a:extLst>
+            </a:blip>
+            <a:stretch>
+              <a:fillRect/>
+            </a:stretch>
+          </p:blipFill>
+          <p:spPr>
+            <a:xfrm>
+              <a:off x="10216454" y="10543945"/>
+              <a:ext cx="5843370" cy="5029200"/>
+            </a:xfrm>
+            <a:prstGeom prst="rect">
+              <a:avLst/>
+            </a:prstGeom>
+          </p:spPr>
+        </p:pic>
+      </p:grpSp>
+      <p:sp>
+        <p:nvSpPr>
+          <p:cNvPr id="41" name="TextBox 40"/>
           <p:cNvSpPr txBox="1"/>
           <p:nvPr/>
         </p:nvSpPr>
         <p:spPr>
           <a:xfrm>
-            <a:off x="863600" y="11284949"/>
-            <a:ext cx="9245600" cy="769441"/>
+            <a:off x="863600" y="19903440"/>
+            <a:ext cx="45719" cy="890115"/>
           </a:xfrm>
           <a:prstGeom prst="rect">
             <a:avLst/>
@@ -3314,29 +4032,25 @@
           <a:noFill/>
         </p:spPr>
         <p:txBody>
-          <a:bodyPr wrap="square" rtlCol="0" anchor="ctr">
+          <a:bodyPr wrap="square" rtlCol="0">
             <a:spAutoFit/>
           </a:bodyPr>
           <a:lstStyle/>
           <a:p>
-            <a:pPr algn="ctr"/>
-            <a:r>
-              <a:rPr lang="en-US" sz="4400" u="dbl" cap="small" dirty="0"/>
-              <a:t>Motivation</a:t>
-            </a:r>
-          </a:p>
-        </p:txBody>
-      </p:sp>
-      <p:sp>
-        <p:nvSpPr>
-          <p:cNvPr id="14" name="TextBox 13"/>
+            <a:endParaRPr lang="en-US" dirty="0"/>
+          </a:p>
+        </p:txBody>
+      </p:sp>
+      <p:sp>
+        <p:nvSpPr>
+          <p:cNvPr id="42" name="TextBox 41"/>
           <p:cNvSpPr txBox="1"/>
           <p:nvPr/>
         </p:nvSpPr>
         <p:spPr>
           <a:xfrm>
-            <a:off x="838200" y="19507155"/>
-            <a:ext cx="9245600" cy="762046"/>
+            <a:off x="863600" y="28806432"/>
+            <a:ext cx="20218400" cy="2646878"/>
           </a:xfrm>
           <a:prstGeom prst="rect">
             <a:avLst/>
@@ -3344,107 +4058,31 @@
           <a:noFill/>
         </p:spPr>
         <p:txBody>
-          <a:bodyPr wrap="square" rtlCol="0" anchor="ctr">
+          <a:bodyPr wrap="square" lIns="457200" tIns="91440" rIns="457200" bIns="91440" numCol="2" spcCol="548640" rtlCol="0">
             <a:spAutoFit/>
           </a:bodyPr>
           <a:lstStyle/>
           <a:p>
-            <a:pPr algn="ctr"/>
-            <a:r>
-              <a:rPr lang="en-US" sz="4400" u="dbl" cap="small" dirty="0"/>
-              <a:t>Proposed Work</a:t>
-            </a:r>
-          </a:p>
-        </p:txBody>
-      </p:sp>
-      <p:sp>
-        <p:nvSpPr>
-          <p:cNvPr id="15" name="TextBox 14"/>
-          <p:cNvSpPr txBox="1"/>
-          <p:nvPr/>
-        </p:nvSpPr>
-        <p:spPr>
-          <a:xfrm>
-            <a:off x="11811000" y="19499760"/>
-            <a:ext cx="9271000" cy="769441"/>
-          </a:xfrm>
-          <a:prstGeom prst="rect">
-            <a:avLst/>
-          </a:prstGeom>
-          <a:noFill/>
-        </p:spPr>
-        <p:txBody>
-          <a:bodyPr wrap="square" rtlCol="0" anchor="ctr">
-            <a:spAutoFit/>
-          </a:bodyPr>
-          <a:lstStyle/>
-          <a:p>
-            <a:pPr algn="ctr"/>
-            <a:r>
-              <a:rPr lang="en-US" sz="4400" u="dbl" cap="small" dirty="0" smtClean="0"/>
-              <a:t>Conclusion</a:t>
-            </a:r>
-            <a:endParaRPr lang="en-US" sz="4400" u="dbl" cap="small" dirty="0"/>
-          </a:p>
-        </p:txBody>
-      </p:sp>
-      <p:sp>
-        <p:nvSpPr>
-          <p:cNvPr id="16" name="TextBox 15"/>
-          <p:cNvSpPr txBox="1"/>
-          <p:nvPr/>
-        </p:nvSpPr>
-        <p:spPr>
-          <a:xfrm>
-            <a:off x="11810999" y="27453744"/>
-            <a:ext cx="9271001" cy="769441"/>
-          </a:xfrm>
-          <a:prstGeom prst="rect">
-            <a:avLst/>
-          </a:prstGeom>
-          <a:noFill/>
-        </p:spPr>
-        <p:txBody>
-          <a:bodyPr wrap="square" rtlCol="0" anchor="ctr">
-            <a:spAutoFit/>
-          </a:bodyPr>
-          <a:lstStyle/>
-          <a:p>
-            <a:pPr algn="ctr"/>
-            <a:r>
-              <a:rPr lang="en-US" sz="4400" u="dbl" cap="small" dirty="0" smtClean="0"/>
-              <a:t>References</a:t>
-            </a:r>
-            <a:endParaRPr lang="en-US" sz="4400" u="dbl" cap="small" dirty="0"/>
-          </a:p>
-        </p:txBody>
-      </p:sp>
-      <p:sp>
-        <p:nvSpPr>
-          <p:cNvPr id="7" name="TextBox 6"/>
-          <p:cNvSpPr txBox="1"/>
-          <p:nvPr/>
-        </p:nvSpPr>
-        <p:spPr>
-          <a:xfrm>
-            <a:off x="838200" y="4707932"/>
-            <a:ext cx="9271000" cy="5601533"/>
-          </a:xfrm>
-          <a:prstGeom prst="rect">
-            <a:avLst/>
-          </a:prstGeom>
-          <a:noFill/>
-        </p:spPr>
-        <p:txBody>
-          <a:bodyPr wrap="square" lIns="182880" tIns="91440" rIns="182880" bIns="91440" rtlCol="0">
-            <a:spAutoFit/>
-          </a:bodyPr>
-          <a:lstStyle/>
-          <a:p>
             <a:pPr algn="just"/>
             <a:r>
               <a:rPr lang="en-US" sz="3200" dirty="0" smtClean="0"/>
-              <a:t>In this poster, we compare the performance (via throughput and latency) of four NoSQL database systems over three operations: put, get, and delete. Three of these systems (Cassandra, </a:t>
+              <a:t>After evaluating the four systems on EC2, we notice that </a:t>
+            </a:r>
+            <a:r>
+              <a:rPr lang="en-US" sz="3200" dirty="0" err="1" smtClean="0"/>
+              <a:t>Redis</a:t>
+            </a:r>
+            <a:r>
+              <a:rPr lang="en-US" sz="3200" dirty="0" smtClean="0"/>
+              <a:t> is the most scalable system overall. This system is an in-memory database that does not implement consistent caching. Therefore, on small key-value pairs, it seems coherent that this system performs the best. Similarly, </a:t>
+            </a:r>
+            <a:r>
+              <a:rPr lang="en-US" sz="3200" dirty="0" err="1" smtClean="0"/>
+              <a:t>PyDHT</a:t>
+            </a:r>
+            <a:r>
+              <a:rPr lang="en-US" sz="3200" dirty="0" smtClean="0"/>
+              <a:t> is in-memory and does not implement replication, making it lighter and more appropriate for this use case. On the other hand, Cassandra and </a:t>
             </a:r>
             <a:r>
               <a:rPr lang="en-US" sz="3200" dirty="0" err="1" smtClean="0"/>
@@ -3452,277 +4090,9 @@
             </a:r>
             <a:r>
               <a:rPr lang="en-US" sz="3200" dirty="0" smtClean="0"/>
-              <a:t>, and </a:t>
-            </a:r>
-            <a:r>
-              <a:rPr lang="en-US" sz="3200" dirty="0" err="1" smtClean="0"/>
-              <a:t>Redis</a:t>
-            </a:r>
-            <a:r>
-              <a:rPr lang="en-US" sz="3200" dirty="0" smtClean="0"/>
-              <a:t>) are developed and supported by teams of developers and implement advanced operations such as replication, </a:t>
-            </a:r>
-            <a:r>
-              <a:rPr lang="en-US" sz="3200" dirty="0" err="1" smtClean="0"/>
-              <a:t>sharding</a:t>
-            </a:r>
-            <a:r>
-              <a:rPr lang="en-US" sz="3200" dirty="0" smtClean="0"/>
-              <a:t>, or node failure management. The last system has been implemented through a one-semester class in Python. We find that system X outperforms all the other systems in these operations.</a:t>
-            </a:r>
-            <a:endParaRPr lang="en-US" sz="3200" dirty="0"/>
-          </a:p>
-        </p:txBody>
-      </p:sp>
-      <p:sp>
-        <p:nvSpPr>
-          <p:cNvPr id="18" name="TextBox 17"/>
-          <p:cNvSpPr txBox="1"/>
-          <p:nvPr/>
-        </p:nvSpPr>
-        <p:spPr>
-          <a:xfrm>
-            <a:off x="838200" y="12054390"/>
-            <a:ext cx="9245599" cy="5601533"/>
-          </a:xfrm>
-          <a:prstGeom prst="rect">
-            <a:avLst/>
-          </a:prstGeom>
-          <a:noFill/>
-        </p:spPr>
-        <p:txBody>
-          <a:bodyPr wrap="square" lIns="182880" tIns="91440" rIns="182880" bIns="91440" rtlCol="0">
-            <a:spAutoFit/>
-          </a:bodyPr>
-          <a:lstStyle/>
-          <a:p>
-            <a:pPr marL="457200" indent="-457200" algn="just">
-              <a:buFont typeface="Arial" panose="020B0604020202020204" pitchFamily="34" charset="0"/>
-              <a:buChar char="•"/>
-            </a:pPr>
-            <a:r>
-              <a:rPr lang="en-US" sz="3200" dirty="0" smtClean="0"/>
-              <a:t>Centralized databases disadvantages:</a:t>
-            </a:r>
-          </a:p>
-          <a:p>
-            <a:pPr marL="1773936" lvl="1" indent="-457200" algn="just">
-              <a:buFont typeface="Arial" panose="020B0604020202020204" pitchFamily="34" charset="0"/>
-              <a:buChar char="•"/>
-            </a:pPr>
-            <a:r>
-              <a:rPr lang="en-US" sz="3200" dirty="0" smtClean="0"/>
-              <a:t>Single point of failure.</a:t>
-            </a:r>
-          </a:p>
-          <a:p>
-            <a:pPr marL="1773936" lvl="1" indent="-457200" algn="just">
-              <a:buFont typeface="Arial" panose="020B0604020202020204" pitchFamily="34" charset="0"/>
-              <a:buChar char="•"/>
-            </a:pPr>
-            <a:r>
-              <a:rPr lang="en-US" sz="3200" dirty="0" smtClean="0"/>
-              <a:t>Bottleneck on IO or CPU.</a:t>
-            </a:r>
-          </a:p>
-          <a:p>
-            <a:pPr marL="1773936" lvl="1" indent="-457200" algn="just">
-              <a:buFont typeface="Arial" panose="020B0604020202020204" pitchFamily="34" charset="0"/>
-              <a:buChar char="•"/>
-            </a:pPr>
-            <a:r>
-              <a:rPr lang="en-US" sz="3200" dirty="0" smtClean="0"/>
-              <a:t>Not flexible enough for high scale computing.</a:t>
-            </a:r>
-          </a:p>
-          <a:p>
-            <a:pPr marL="457200" indent="-457200" algn="just">
-              <a:buFont typeface="Arial" panose="020B0604020202020204" pitchFamily="34" charset="0"/>
-              <a:buChar char="•"/>
-            </a:pPr>
-            <a:r>
-              <a:rPr lang="en-US" sz="3200" dirty="0" smtClean="0"/>
-              <a:t>Relational database?</a:t>
-            </a:r>
-          </a:p>
-          <a:p>
-            <a:pPr marL="1773936" lvl="1" indent="-457200" algn="just">
-              <a:buFont typeface="Arial" panose="020B0604020202020204" pitchFamily="34" charset="0"/>
-              <a:buChar char="•"/>
-            </a:pPr>
-            <a:r>
-              <a:rPr lang="en-US" sz="3200" dirty="0" smtClean="0"/>
-              <a:t>Relational model is not flexible.</a:t>
-            </a:r>
-          </a:p>
-          <a:p>
-            <a:pPr marL="1773936" lvl="1" indent="-457200" algn="just">
-              <a:buFont typeface="Arial" panose="020B0604020202020204" pitchFamily="34" charset="0"/>
-              <a:buChar char="•"/>
-            </a:pPr>
-            <a:r>
-              <a:rPr lang="en-US" sz="3200" dirty="0" smtClean="0"/>
-              <a:t>Languages similar to SQL can be implemented (e.g. CQL in Cassandra).</a:t>
-            </a:r>
-          </a:p>
-          <a:p>
-            <a:pPr marL="1773936" lvl="1" indent="-457200" algn="just">
-              <a:buFont typeface="Arial" panose="020B0604020202020204" pitchFamily="34" charset="0"/>
-              <a:buChar char="•"/>
-            </a:pPr>
-            <a:r>
-              <a:rPr lang="en-US" sz="3200" dirty="0" smtClean="0"/>
-              <a:t>Key-value stores can easily be used by other applications (e.g. ZHT).</a:t>
-            </a:r>
-          </a:p>
-        </p:txBody>
-      </p:sp>
-      <p:sp>
-        <p:nvSpPr>
-          <p:cNvPr id="20" name="TextBox 19"/>
-          <p:cNvSpPr txBox="1"/>
-          <p:nvPr/>
-        </p:nvSpPr>
-        <p:spPr>
-          <a:xfrm>
-            <a:off x="863600" y="20269201"/>
-            <a:ext cx="9239046" cy="9048631"/>
-          </a:xfrm>
-          <a:prstGeom prst="rect">
-            <a:avLst/>
-          </a:prstGeom>
-          <a:noFill/>
-        </p:spPr>
-        <p:txBody>
-          <a:bodyPr wrap="square" lIns="182880" tIns="91440" rIns="182880" bIns="91440" rtlCol="0">
-            <a:spAutoFit/>
-          </a:bodyPr>
-          <a:lstStyle/>
-          <a:p>
-            <a:pPr marL="457200" indent="-457200" algn="just">
-              <a:buFont typeface="Arial" panose="020B0604020202020204" pitchFamily="34" charset="0"/>
-              <a:buChar char="•"/>
-            </a:pPr>
-            <a:r>
-              <a:rPr lang="en-US" sz="3200" dirty="0" smtClean="0"/>
-              <a:t>Compare throughput and latency performance of four NoSQL systems on put, get, and delete operations:</a:t>
-            </a:r>
-          </a:p>
-          <a:p>
-            <a:pPr marL="1773936" lvl="1" indent="-457200" algn="just">
-              <a:buFont typeface="Arial" panose="020B0604020202020204" pitchFamily="34" charset="0"/>
-              <a:buChar char="•"/>
-            </a:pPr>
-            <a:r>
-              <a:rPr lang="en-US" sz="3200" dirty="0" smtClean="0"/>
-              <a:t>Cassandra</a:t>
-            </a:r>
-          </a:p>
-          <a:p>
-            <a:pPr marL="1773936" lvl="1" indent="-457200" algn="just">
-              <a:buFont typeface="Arial" panose="020B0604020202020204" pitchFamily="34" charset="0"/>
-              <a:buChar char="•"/>
-            </a:pPr>
-            <a:r>
-              <a:rPr lang="en-US" sz="3200" dirty="0" err="1" smtClean="0"/>
-              <a:t>Riak</a:t>
+              <a:t> are NoSQL databases that are more robust to failures as well as best fitted for handling large amount of data.</a:t>
             </a:r>
             <a:endParaRPr lang="en-US" sz="3200" dirty="0" smtClean="0"/>
-          </a:p>
-          <a:p>
-            <a:pPr marL="1773936" lvl="1" indent="-457200" algn="just">
-              <a:buFont typeface="Arial" panose="020B0604020202020204" pitchFamily="34" charset="0"/>
-              <a:buChar char="•"/>
-            </a:pPr>
-            <a:r>
-              <a:rPr lang="en-US" sz="3200" dirty="0" err="1" smtClean="0"/>
-              <a:t>Redis</a:t>
-            </a:r>
-            <a:endParaRPr lang="en-US" sz="3200" dirty="0" smtClean="0"/>
-          </a:p>
-          <a:p>
-            <a:pPr marL="1773936" lvl="1" indent="-457200" algn="just">
-              <a:buFont typeface="Arial" panose="020B0604020202020204" pitchFamily="34" charset="0"/>
-              <a:buChar char="•"/>
-            </a:pPr>
-            <a:r>
-              <a:rPr lang="en-US" sz="3200" dirty="0" err="1" smtClean="0"/>
-              <a:t>PyDHT</a:t>
-            </a:r>
-            <a:endParaRPr lang="en-US" sz="3200" dirty="0" smtClean="0"/>
-          </a:p>
-          <a:p>
-            <a:pPr marL="457200" indent="-457200" algn="just">
-              <a:buFont typeface="Arial" panose="020B0604020202020204" pitchFamily="34" charset="0"/>
-              <a:buChar char="•"/>
-            </a:pPr>
-            <a:r>
-              <a:rPr lang="en-US" sz="3200" dirty="0" smtClean="0"/>
-              <a:t>Deploy each system over 16 m3.large EC2 instances.</a:t>
-            </a:r>
-          </a:p>
-          <a:p>
-            <a:pPr marL="457200" indent="-457200" algn="just">
-              <a:buFont typeface="Arial" panose="020B0604020202020204" pitchFamily="34" charset="0"/>
-              <a:buChar char="•"/>
-            </a:pPr>
-            <a:r>
-              <a:rPr lang="en-US" sz="3200" dirty="0" smtClean="0"/>
-              <a:t>Scale the nodes executing concurrent requests from 1 to 16.</a:t>
-            </a:r>
-          </a:p>
-          <a:p>
-            <a:pPr marL="457200" indent="-457200" algn="just">
-              <a:buFont typeface="Arial" panose="020B0604020202020204" pitchFamily="34" charset="0"/>
-              <a:buChar char="•"/>
-            </a:pPr>
-            <a:r>
-              <a:rPr lang="en-US" sz="3200" dirty="0" smtClean="0"/>
-              <a:t>Each concurrent node run 10K operations of each type (put, get, delete).</a:t>
-            </a:r>
-          </a:p>
-          <a:p>
-            <a:pPr marL="457200" indent="-457200" algn="just">
-              <a:buFont typeface="Arial" panose="020B0604020202020204" pitchFamily="34" charset="0"/>
-              <a:buChar char="•"/>
-            </a:pPr>
-            <a:r>
-              <a:rPr lang="en-US" sz="3200" dirty="0" smtClean="0"/>
-              <a:t>Compute throughput in </a:t>
-            </a:r>
-            <a:r>
-              <a:rPr lang="en-US" sz="3200" dirty="0" err="1" smtClean="0"/>
-              <a:t>KOps</a:t>
-            </a:r>
-            <a:r>
-              <a:rPr lang="en-US" sz="3200" dirty="0" smtClean="0"/>
-              <a:t>/sec and latency in </a:t>
-            </a:r>
-            <a:r>
-              <a:rPr lang="en-US" sz="3200" dirty="0" err="1" smtClean="0"/>
-              <a:t>ms.</a:t>
-            </a:r>
-            <a:endParaRPr lang="en-US" sz="3200" dirty="0" smtClean="0"/>
-          </a:p>
-          <a:p>
-            <a:pPr marL="457200" indent="-457200" algn="just">
-              <a:buFont typeface="Arial" panose="020B0604020202020204" pitchFamily="34" charset="0"/>
-              <a:buChar char="•"/>
-            </a:pPr>
-            <a:r>
-              <a:rPr lang="en-US" sz="3200" dirty="0" smtClean="0"/>
-              <a:t>Visualize the results to know which system provides the best throughput, the lowest latency.</a:t>
-            </a:r>
-          </a:p>
-          <a:p>
-            <a:pPr marL="457200" indent="-457200" algn="just">
-              <a:buFont typeface="Arial" panose="020B0604020202020204" pitchFamily="34" charset="0"/>
-              <a:buChar char="•"/>
-            </a:pPr>
-            <a:r>
-              <a:rPr lang="en-US" sz="3200" dirty="0" smtClean="0"/>
-              <a:t>Which system is the most scalable overall?</a:t>
-            </a:r>
           </a:p>
         </p:txBody>
       </p:sp>
@@ -3736,6 +4106,13 @@
   <p:clrMapOvr>
     <a:masterClrMapping/>
   </p:clrMapOvr>
+  <p:timing>
+    <p:tnLst>
+      <p:par>
+        <p:cTn id="1" dur="indefinite" restart="never" nodeType="tmRoot"/>
+      </p:par>
+    </p:tnLst>
+  </p:timing>
 </p:sld>
 </file>
 

</xml_diff>